<commit_message>
changes to documentation and presentation
</commit_message>
<xml_diff>
--- a/Artificial Intelligence Presentation.pptx
+++ b/Artificial Intelligence Presentation.pptx
@@ -275,7 +275,7 @@
       </p15:notesGuideLst>
     </p:ext>
     <p:ext uri="http://customooxmlschemas.google.com/">
-      <go:slidesCustomData xmlns:go="http://customooxmlschemas.google.com/" xmlns:p15="http://schemas.microsoft.com/office/powerpoint/2012/main" xmlns:p14="http://schemas.microsoft.com/office/powerpoint/2010/main" xmlns:com="http://schemas.openxmlformats.org/drawingml/2006/compatibility" xmlns:pvml="urn:schemas-microsoft-com:office:powerpoint" xmlns:v="urn:schemas-microsoft-com:vml" xmlns:o="urn:schemas-microsoft-com:office:office" xmlns:dgm="http://schemas.openxmlformats.org/drawingml/2006/diagram" xmlns:c="http://schemas.openxmlformats.org/drawingml/2006/chart" xmlns:mv="urn:schemas-microsoft-com:mac:vml" xmlns:mc="http://schemas.openxmlformats.org/markup-compatibility/2006" xmlns="" r:id="rId17" roundtripDataSignature="AMtx7miS316doKUK7ZKTfIoLgxv0ryc6zw=="/>
+      <go:slidesCustomData xmlns="" xmlns:mc="http://schemas.openxmlformats.org/markup-compatibility/2006" xmlns:mv="urn:schemas-microsoft-com:mac:vml" xmlns:c="http://schemas.openxmlformats.org/drawingml/2006/chart" xmlns:dgm="http://schemas.openxmlformats.org/drawingml/2006/diagram" xmlns:o="urn:schemas-microsoft-com:office:office" xmlns:v="urn:schemas-microsoft-com:vml" xmlns:pvml="urn:schemas-microsoft-com:office:powerpoint" xmlns:com="http://schemas.openxmlformats.org/drawingml/2006/compatibility" xmlns:p14="http://schemas.microsoft.com/office/powerpoint/2010/main" xmlns:p15="http://schemas.microsoft.com/office/powerpoint/2012/main" xmlns:go="http://customooxmlschemas.google.com/" r:id="rId17" roundtripDataSignature="AMtx7miS316doKUK7ZKTfIoLgxv0ryc6zw=="/>
     </p:ext>
   </p:extLst>
 </p:presentation>
@@ -9144,7 +9144,7 @@
             </a:pPr>
             <a:r>
               <a:rPr lang="en-IE" dirty="0"/>
-              <a:t>mankadp@tcd.ie- 18313732</a:t>
+              <a:t>mankadp@tcd.ie - 18313732</a:t>
             </a:r>
           </a:p>
           <a:p>
@@ -9162,12 +9162,16 @@
               <a:buNone/>
             </a:pPr>
             <a:r>
+              <a:rPr lang="en-IE" dirty="0"/>
+              <a:t>jeevasag@tcd.ie</a:t>
+            </a:r>
+            <a:r>
               <a:rPr lang="en-IE" dirty="0">
                 <a:solidFill>
                   <a:schemeClr val="lt1"/>
                 </a:solidFill>
               </a:rPr>
-              <a:t>jeevasag@tcd.ie-18303806</a:t>
+              <a:t> -18303806</a:t>
             </a:r>
             <a:endParaRPr dirty="0"/>
           </a:p>
@@ -9186,12 +9190,16 @@
               <a:buNone/>
             </a:pPr>
             <a:r>
+              <a:rPr lang="en-IE" dirty="0"/>
+              <a:t>ghoshso@tcd.ie</a:t>
+            </a:r>
+            <a:r>
               <a:rPr lang="en-IE" dirty="0">
                 <a:solidFill>
                   <a:schemeClr val="lt1"/>
                 </a:solidFill>
               </a:rPr>
-              <a:t>ghoshso@tcd.ie-19317919</a:t>
+              <a:t> -19317919</a:t>
             </a:r>
             <a:endParaRPr dirty="0"/>
           </a:p>
@@ -9210,12 +9218,16 @@
               <a:buNone/>
             </a:pPr>
             <a:r>
+              <a:rPr lang="en-IE" dirty="0"/>
+              <a:t>goelaa@tcd.ie</a:t>
+            </a:r>
+            <a:r>
               <a:rPr lang="en-IE" dirty="0">
                 <a:solidFill>
                   <a:schemeClr val="lt1"/>
                 </a:solidFill>
               </a:rPr>
-              <a:t>goelaa@tcd.ie- 19308546</a:t>
+              <a:t> - 19308546</a:t>
             </a:r>
             <a:endParaRPr dirty="0"/>
           </a:p>
@@ -9234,12 +9246,16 @@
               <a:buNone/>
             </a:pPr>
             <a:r>
+              <a:rPr lang="en-IE" dirty="0"/>
+              <a:t>chavadyg@tcd.ie</a:t>
+            </a:r>
+            <a:r>
               <a:rPr lang="en-IE" dirty="0">
                 <a:solidFill>
                   <a:schemeClr val="lt1"/>
                 </a:solidFill>
               </a:rPr>
-              <a:t>chavadyg@tcd.ie - </a:t>
+              <a:t>  -  19305272</a:t>
             </a:r>
             <a:endParaRPr dirty="0"/>
           </a:p>

</xml_diff>